<commit_message>
adding logo for abgabe
</commit_message>
<xml_diff>
--- a/design/presentation/Kompose_Presentation_Draft.pptx
+++ b/design/presentation/Kompose_Presentation_Draft.pptx
@@ -107,7 +107,16 @@
       </a:defRPr>
     </a:lvl9pPr>
   </p:defaultTextStyle>
+  <p:extLst>
+    <p:ext uri="{EFAFB233-063F-42B5-8137-9DF3F51BA10A}">
+      <p15:sldGuideLst xmlns:p15="http://schemas.microsoft.com/office/powerpoint/2012/main"/>
+    </p:ext>
+  </p:extLst>
 </p:presentation>
+</file>
+
+<file path=ppt/revisionInfo.xml><?xml version="1.0" encoding="utf-8"?>
+<p1510:revInfo xmlns:a="http://schemas.openxmlformats.org/drawingml/2006/main" xmlns:r="http://schemas.openxmlformats.org/officeDocument/2006/relationships" xmlns:p1510="http://schemas.microsoft.com/office/powerpoint/2015/10/main"/>
 </file>
 
 <file path=ppt/slideLayouts/slideLayout1.xml><?xml version="1.0" encoding="utf-8"?>
@@ -152,7 +161,7 @@
           </a:lstStyle>
           <a:p>
             <a:r>
-              <a:rPr lang="de-DE" smtClean="0"/>
+              <a:rPr lang="de-DE"/>
               <a:t>Titelmasterformat durch Klicken bearbeiten</a:t>
             </a:r>
             <a:endParaRPr lang="en-GB"/>
@@ -217,7 +226,7 @@
           </a:lstStyle>
           <a:p>
             <a:r>
-              <a:rPr lang="de-DE" smtClean="0"/>
+              <a:rPr lang="de-DE"/>
               <a:t>Formatvorlage des Untertitelmasters durch Klicken bearbeiten</a:t>
             </a:r>
             <a:endParaRPr lang="en-GB"/>
@@ -241,7 +250,7 @@
           <a:p>
             <a:fld id="{92500A94-974E-4435-A24C-4E7E461F6CCF}" type="datetimeFigureOut">
               <a:rPr lang="en-GB" smtClean="0"/>
-              <a:t>10/12/2017</a:t>
+              <a:t>12/12/2017</a:t>
             </a:fld>
             <a:endParaRPr lang="en-GB"/>
           </a:p>
@@ -283,7 +292,7 @@
           <a:p>
             <a:fld id="{1D569112-266E-4592-BA97-2F0972958E72}" type="slidenum">
               <a:rPr lang="en-GB" smtClean="0"/>
-              <a:t>‹Nr.›</a:t>
+              <a:t>‹#›</a:t>
             </a:fld>
             <a:endParaRPr lang="en-GB"/>
           </a:p>
@@ -335,7 +344,7 @@
           <a:lstStyle/>
           <a:p>
             <a:r>
-              <a:rPr lang="de-DE" smtClean="0"/>
+              <a:rPr lang="de-DE"/>
               <a:t>Titelmasterformat durch Klicken bearbeiten</a:t>
             </a:r>
             <a:endParaRPr lang="en-GB"/>
@@ -359,35 +368,35 @@
           <a:p>
             <a:pPr lvl="0"/>
             <a:r>
-              <a:rPr lang="de-DE" smtClean="0"/>
+              <a:rPr lang="de-DE"/>
               <a:t>Textmasterformat bearbeiten</a:t>
             </a:r>
           </a:p>
           <a:p>
             <a:pPr lvl="1"/>
             <a:r>
-              <a:rPr lang="de-DE" smtClean="0"/>
+              <a:rPr lang="de-DE"/>
               <a:t>Zweite Ebene</a:t>
             </a:r>
           </a:p>
           <a:p>
             <a:pPr lvl="2"/>
             <a:r>
-              <a:rPr lang="de-DE" smtClean="0"/>
+              <a:rPr lang="de-DE"/>
               <a:t>Dritte Ebene</a:t>
             </a:r>
           </a:p>
           <a:p>
             <a:pPr lvl="3"/>
             <a:r>
-              <a:rPr lang="de-DE" smtClean="0"/>
+              <a:rPr lang="de-DE"/>
               <a:t>Vierte Ebene</a:t>
             </a:r>
           </a:p>
           <a:p>
             <a:pPr lvl="4"/>
             <a:r>
-              <a:rPr lang="de-DE" smtClean="0"/>
+              <a:rPr lang="de-DE"/>
               <a:t>Fünfte Ebene</a:t>
             </a:r>
             <a:endParaRPr lang="en-GB"/>
@@ -411,7 +420,7 @@
           <a:p>
             <a:fld id="{92500A94-974E-4435-A24C-4E7E461F6CCF}" type="datetimeFigureOut">
               <a:rPr lang="en-GB" smtClean="0"/>
-              <a:t>10/12/2017</a:t>
+              <a:t>12/12/2017</a:t>
             </a:fld>
             <a:endParaRPr lang="en-GB"/>
           </a:p>
@@ -453,7 +462,7 @@
           <a:p>
             <a:fld id="{1D569112-266E-4592-BA97-2F0972958E72}" type="slidenum">
               <a:rPr lang="en-GB" smtClean="0"/>
-              <a:t>‹Nr.›</a:t>
+              <a:t>‹#›</a:t>
             </a:fld>
             <a:endParaRPr lang="en-GB"/>
           </a:p>
@@ -510,7 +519,7 @@
           <a:lstStyle/>
           <a:p>
             <a:r>
-              <a:rPr lang="de-DE" smtClean="0"/>
+              <a:rPr lang="de-DE"/>
               <a:t>Titelmasterformat durch Klicken bearbeiten</a:t>
             </a:r>
             <a:endParaRPr lang="en-GB"/>
@@ -539,35 +548,35 @@
           <a:p>
             <a:pPr lvl="0"/>
             <a:r>
-              <a:rPr lang="de-DE" smtClean="0"/>
+              <a:rPr lang="de-DE"/>
               <a:t>Textmasterformat bearbeiten</a:t>
             </a:r>
           </a:p>
           <a:p>
             <a:pPr lvl="1"/>
             <a:r>
-              <a:rPr lang="de-DE" smtClean="0"/>
+              <a:rPr lang="de-DE"/>
               <a:t>Zweite Ebene</a:t>
             </a:r>
           </a:p>
           <a:p>
             <a:pPr lvl="2"/>
             <a:r>
-              <a:rPr lang="de-DE" smtClean="0"/>
+              <a:rPr lang="de-DE"/>
               <a:t>Dritte Ebene</a:t>
             </a:r>
           </a:p>
           <a:p>
             <a:pPr lvl="3"/>
             <a:r>
-              <a:rPr lang="de-DE" smtClean="0"/>
+              <a:rPr lang="de-DE"/>
               <a:t>Vierte Ebene</a:t>
             </a:r>
           </a:p>
           <a:p>
             <a:pPr lvl="4"/>
             <a:r>
-              <a:rPr lang="de-DE" smtClean="0"/>
+              <a:rPr lang="de-DE"/>
               <a:t>Fünfte Ebene</a:t>
             </a:r>
             <a:endParaRPr lang="en-GB"/>
@@ -591,7 +600,7 @@
           <a:p>
             <a:fld id="{92500A94-974E-4435-A24C-4E7E461F6CCF}" type="datetimeFigureOut">
               <a:rPr lang="en-GB" smtClean="0"/>
-              <a:t>10/12/2017</a:t>
+              <a:t>12/12/2017</a:t>
             </a:fld>
             <a:endParaRPr lang="en-GB"/>
           </a:p>
@@ -633,7 +642,7 @@
           <a:p>
             <a:fld id="{1D569112-266E-4592-BA97-2F0972958E72}" type="slidenum">
               <a:rPr lang="en-GB" smtClean="0"/>
-              <a:t>‹Nr.›</a:t>
+              <a:t>‹#›</a:t>
             </a:fld>
             <a:endParaRPr lang="en-GB"/>
           </a:p>
@@ -685,7 +694,7 @@
           <a:lstStyle/>
           <a:p>
             <a:r>
-              <a:rPr lang="de-DE" smtClean="0"/>
+              <a:rPr lang="de-DE"/>
               <a:t>Titelmasterformat durch Klicken bearbeiten</a:t>
             </a:r>
             <a:endParaRPr lang="en-GB"/>
@@ -709,35 +718,35 @@
           <a:p>
             <a:pPr lvl="0"/>
             <a:r>
-              <a:rPr lang="de-DE" smtClean="0"/>
+              <a:rPr lang="de-DE"/>
               <a:t>Textmasterformat bearbeiten</a:t>
             </a:r>
           </a:p>
           <a:p>
             <a:pPr lvl="1"/>
             <a:r>
-              <a:rPr lang="de-DE" smtClean="0"/>
+              <a:rPr lang="de-DE"/>
               <a:t>Zweite Ebene</a:t>
             </a:r>
           </a:p>
           <a:p>
             <a:pPr lvl="2"/>
             <a:r>
-              <a:rPr lang="de-DE" smtClean="0"/>
+              <a:rPr lang="de-DE"/>
               <a:t>Dritte Ebene</a:t>
             </a:r>
           </a:p>
           <a:p>
             <a:pPr lvl="3"/>
             <a:r>
-              <a:rPr lang="de-DE" smtClean="0"/>
+              <a:rPr lang="de-DE"/>
               <a:t>Vierte Ebene</a:t>
             </a:r>
           </a:p>
           <a:p>
             <a:pPr lvl="4"/>
             <a:r>
-              <a:rPr lang="de-DE" smtClean="0"/>
+              <a:rPr lang="de-DE"/>
               <a:t>Fünfte Ebene</a:t>
             </a:r>
             <a:endParaRPr lang="en-GB"/>
@@ -761,7 +770,7 @@
           <a:p>
             <a:fld id="{92500A94-974E-4435-A24C-4E7E461F6CCF}" type="datetimeFigureOut">
               <a:rPr lang="en-GB" smtClean="0"/>
-              <a:t>10/12/2017</a:t>
+              <a:t>12/12/2017</a:t>
             </a:fld>
             <a:endParaRPr lang="en-GB"/>
           </a:p>
@@ -803,7 +812,7 @@
           <a:p>
             <a:fld id="{1D569112-266E-4592-BA97-2F0972958E72}" type="slidenum">
               <a:rPr lang="en-GB" smtClean="0"/>
-              <a:t>‹Nr.›</a:t>
+              <a:t>‹#›</a:t>
             </a:fld>
             <a:endParaRPr lang="en-GB"/>
           </a:p>
@@ -864,7 +873,7 @@
           </a:lstStyle>
           <a:p>
             <a:r>
-              <a:rPr lang="de-DE" smtClean="0"/>
+              <a:rPr lang="de-DE"/>
               <a:t>Titelmasterformat durch Klicken bearbeiten</a:t>
             </a:r>
             <a:endParaRPr lang="en-GB"/>
@@ -984,7 +993,7 @@
           <a:p>
             <a:pPr lvl="0"/>
             <a:r>
-              <a:rPr lang="de-DE" smtClean="0"/>
+              <a:rPr lang="de-DE"/>
               <a:t>Textmasterformat bearbeiten</a:t>
             </a:r>
           </a:p>
@@ -1007,7 +1016,7 @@
           <a:p>
             <a:fld id="{92500A94-974E-4435-A24C-4E7E461F6CCF}" type="datetimeFigureOut">
               <a:rPr lang="en-GB" smtClean="0"/>
-              <a:t>10/12/2017</a:t>
+              <a:t>12/12/2017</a:t>
             </a:fld>
             <a:endParaRPr lang="en-GB"/>
           </a:p>
@@ -1049,7 +1058,7 @@
           <a:p>
             <a:fld id="{1D569112-266E-4592-BA97-2F0972958E72}" type="slidenum">
               <a:rPr lang="en-GB" smtClean="0"/>
-              <a:t>‹Nr.›</a:t>
+              <a:t>‹#›</a:t>
             </a:fld>
             <a:endParaRPr lang="en-GB"/>
           </a:p>
@@ -1101,7 +1110,7 @@
           <a:lstStyle/>
           <a:p>
             <a:r>
-              <a:rPr lang="de-DE" smtClean="0"/>
+              <a:rPr lang="de-DE"/>
               <a:t>Titelmasterformat durch Klicken bearbeiten</a:t>
             </a:r>
             <a:endParaRPr lang="en-GB"/>
@@ -1130,35 +1139,35 @@
           <a:p>
             <a:pPr lvl="0"/>
             <a:r>
-              <a:rPr lang="de-DE" smtClean="0"/>
+              <a:rPr lang="de-DE"/>
               <a:t>Textmasterformat bearbeiten</a:t>
             </a:r>
           </a:p>
           <a:p>
             <a:pPr lvl="1"/>
             <a:r>
-              <a:rPr lang="de-DE" smtClean="0"/>
+              <a:rPr lang="de-DE"/>
               <a:t>Zweite Ebene</a:t>
             </a:r>
           </a:p>
           <a:p>
             <a:pPr lvl="2"/>
             <a:r>
-              <a:rPr lang="de-DE" smtClean="0"/>
+              <a:rPr lang="de-DE"/>
               <a:t>Dritte Ebene</a:t>
             </a:r>
           </a:p>
           <a:p>
             <a:pPr lvl="3"/>
             <a:r>
-              <a:rPr lang="de-DE" smtClean="0"/>
+              <a:rPr lang="de-DE"/>
               <a:t>Vierte Ebene</a:t>
             </a:r>
           </a:p>
           <a:p>
             <a:pPr lvl="4"/>
             <a:r>
-              <a:rPr lang="de-DE" smtClean="0"/>
+              <a:rPr lang="de-DE"/>
               <a:t>Fünfte Ebene</a:t>
             </a:r>
             <a:endParaRPr lang="en-GB"/>
@@ -1187,35 +1196,35 @@
           <a:p>
             <a:pPr lvl="0"/>
             <a:r>
-              <a:rPr lang="de-DE" smtClean="0"/>
+              <a:rPr lang="de-DE"/>
               <a:t>Textmasterformat bearbeiten</a:t>
             </a:r>
           </a:p>
           <a:p>
             <a:pPr lvl="1"/>
             <a:r>
-              <a:rPr lang="de-DE" smtClean="0"/>
+              <a:rPr lang="de-DE"/>
               <a:t>Zweite Ebene</a:t>
             </a:r>
           </a:p>
           <a:p>
             <a:pPr lvl="2"/>
             <a:r>
-              <a:rPr lang="de-DE" smtClean="0"/>
+              <a:rPr lang="de-DE"/>
               <a:t>Dritte Ebene</a:t>
             </a:r>
           </a:p>
           <a:p>
             <a:pPr lvl="3"/>
             <a:r>
-              <a:rPr lang="de-DE" smtClean="0"/>
+              <a:rPr lang="de-DE"/>
               <a:t>Vierte Ebene</a:t>
             </a:r>
           </a:p>
           <a:p>
             <a:pPr lvl="4"/>
             <a:r>
-              <a:rPr lang="de-DE" smtClean="0"/>
+              <a:rPr lang="de-DE"/>
               <a:t>Fünfte Ebene</a:t>
             </a:r>
             <a:endParaRPr lang="en-GB"/>
@@ -1239,7 +1248,7 @@
           <a:p>
             <a:fld id="{92500A94-974E-4435-A24C-4E7E461F6CCF}" type="datetimeFigureOut">
               <a:rPr lang="en-GB" smtClean="0"/>
-              <a:t>10/12/2017</a:t>
+              <a:t>12/12/2017</a:t>
             </a:fld>
             <a:endParaRPr lang="en-GB"/>
           </a:p>
@@ -1281,7 +1290,7 @@
           <a:p>
             <a:fld id="{1D569112-266E-4592-BA97-2F0972958E72}" type="slidenum">
               <a:rPr lang="en-GB" smtClean="0"/>
-              <a:t>‹Nr.›</a:t>
+              <a:t>‹#›</a:t>
             </a:fld>
             <a:endParaRPr lang="en-GB"/>
           </a:p>
@@ -1338,7 +1347,7 @@
           <a:lstStyle/>
           <a:p>
             <a:r>
-              <a:rPr lang="de-DE" smtClean="0"/>
+              <a:rPr lang="de-DE"/>
               <a:t>Titelmasterformat durch Klicken bearbeiten</a:t>
             </a:r>
             <a:endParaRPr lang="en-GB"/>
@@ -1404,7 +1413,7 @@
           <a:p>
             <a:pPr lvl="0"/>
             <a:r>
-              <a:rPr lang="de-DE" smtClean="0"/>
+              <a:rPr lang="de-DE"/>
               <a:t>Textmasterformat bearbeiten</a:t>
             </a:r>
           </a:p>
@@ -1432,35 +1441,35 @@
           <a:p>
             <a:pPr lvl="0"/>
             <a:r>
-              <a:rPr lang="de-DE" smtClean="0"/>
+              <a:rPr lang="de-DE"/>
               <a:t>Textmasterformat bearbeiten</a:t>
             </a:r>
           </a:p>
           <a:p>
             <a:pPr lvl="1"/>
             <a:r>
-              <a:rPr lang="de-DE" smtClean="0"/>
+              <a:rPr lang="de-DE"/>
               <a:t>Zweite Ebene</a:t>
             </a:r>
           </a:p>
           <a:p>
             <a:pPr lvl="2"/>
             <a:r>
-              <a:rPr lang="de-DE" smtClean="0"/>
+              <a:rPr lang="de-DE"/>
               <a:t>Dritte Ebene</a:t>
             </a:r>
           </a:p>
           <a:p>
             <a:pPr lvl="3"/>
             <a:r>
-              <a:rPr lang="de-DE" smtClean="0"/>
+              <a:rPr lang="de-DE"/>
               <a:t>Vierte Ebene</a:t>
             </a:r>
           </a:p>
           <a:p>
             <a:pPr lvl="4"/>
             <a:r>
-              <a:rPr lang="de-DE" smtClean="0"/>
+              <a:rPr lang="de-DE"/>
               <a:t>Fünfte Ebene</a:t>
             </a:r>
             <a:endParaRPr lang="en-GB"/>
@@ -1526,7 +1535,7 @@
           <a:p>
             <a:pPr lvl="0"/>
             <a:r>
-              <a:rPr lang="de-DE" smtClean="0"/>
+              <a:rPr lang="de-DE"/>
               <a:t>Textmasterformat bearbeiten</a:t>
             </a:r>
           </a:p>
@@ -1554,35 +1563,35 @@
           <a:p>
             <a:pPr lvl="0"/>
             <a:r>
-              <a:rPr lang="de-DE" smtClean="0"/>
+              <a:rPr lang="de-DE"/>
               <a:t>Textmasterformat bearbeiten</a:t>
             </a:r>
           </a:p>
           <a:p>
             <a:pPr lvl="1"/>
             <a:r>
-              <a:rPr lang="de-DE" smtClean="0"/>
+              <a:rPr lang="de-DE"/>
               <a:t>Zweite Ebene</a:t>
             </a:r>
           </a:p>
           <a:p>
             <a:pPr lvl="2"/>
             <a:r>
-              <a:rPr lang="de-DE" smtClean="0"/>
+              <a:rPr lang="de-DE"/>
               <a:t>Dritte Ebene</a:t>
             </a:r>
           </a:p>
           <a:p>
             <a:pPr lvl="3"/>
             <a:r>
-              <a:rPr lang="de-DE" smtClean="0"/>
+              <a:rPr lang="de-DE"/>
               <a:t>Vierte Ebene</a:t>
             </a:r>
           </a:p>
           <a:p>
             <a:pPr lvl="4"/>
             <a:r>
-              <a:rPr lang="de-DE" smtClean="0"/>
+              <a:rPr lang="de-DE"/>
               <a:t>Fünfte Ebene</a:t>
             </a:r>
             <a:endParaRPr lang="en-GB"/>
@@ -1606,7 +1615,7 @@
           <a:p>
             <a:fld id="{92500A94-974E-4435-A24C-4E7E461F6CCF}" type="datetimeFigureOut">
               <a:rPr lang="en-GB" smtClean="0"/>
-              <a:t>10/12/2017</a:t>
+              <a:t>12/12/2017</a:t>
             </a:fld>
             <a:endParaRPr lang="en-GB"/>
           </a:p>
@@ -1648,7 +1657,7 @@
           <a:p>
             <a:fld id="{1D569112-266E-4592-BA97-2F0972958E72}" type="slidenum">
               <a:rPr lang="en-GB" smtClean="0"/>
-              <a:t>‹Nr.›</a:t>
+              <a:t>‹#›</a:t>
             </a:fld>
             <a:endParaRPr lang="en-GB"/>
           </a:p>
@@ -1700,7 +1709,7 @@
           <a:lstStyle/>
           <a:p>
             <a:r>
-              <a:rPr lang="de-DE" smtClean="0"/>
+              <a:rPr lang="de-DE"/>
               <a:t>Titelmasterformat durch Klicken bearbeiten</a:t>
             </a:r>
             <a:endParaRPr lang="en-GB"/>
@@ -1724,7 +1733,7 @@
           <a:p>
             <a:fld id="{92500A94-974E-4435-A24C-4E7E461F6CCF}" type="datetimeFigureOut">
               <a:rPr lang="en-GB" smtClean="0"/>
-              <a:t>10/12/2017</a:t>
+              <a:t>12/12/2017</a:t>
             </a:fld>
             <a:endParaRPr lang="en-GB"/>
           </a:p>
@@ -1766,7 +1775,7 @@
           <a:p>
             <a:fld id="{1D569112-266E-4592-BA97-2F0972958E72}" type="slidenum">
               <a:rPr lang="en-GB" smtClean="0"/>
-              <a:t>‹Nr.›</a:t>
+              <a:t>‹#›</a:t>
             </a:fld>
             <a:endParaRPr lang="en-GB"/>
           </a:p>
@@ -1819,7 +1828,7 @@
           <a:p>
             <a:fld id="{92500A94-974E-4435-A24C-4E7E461F6CCF}" type="datetimeFigureOut">
               <a:rPr lang="en-GB" smtClean="0"/>
-              <a:t>10/12/2017</a:t>
+              <a:t>12/12/2017</a:t>
             </a:fld>
             <a:endParaRPr lang="en-GB"/>
           </a:p>
@@ -1861,7 +1870,7 @@
           <a:p>
             <a:fld id="{1D569112-266E-4592-BA97-2F0972958E72}" type="slidenum">
               <a:rPr lang="en-GB" smtClean="0"/>
-              <a:t>‹Nr.›</a:t>
+              <a:t>‹#›</a:t>
             </a:fld>
             <a:endParaRPr lang="en-GB"/>
           </a:p>
@@ -1922,7 +1931,7 @@
           </a:lstStyle>
           <a:p>
             <a:r>
-              <a:rPr lang="de-DE" smtClean="0"/>
+              <a:rPr lang="de-DE"/>
               <a:t>Titelmasterformat durch Klicken bearbeiten</a:t>
             </a:r>
             <a:endParaRPr lang="en-GB"/>
@@ -1979,35 +1988,35 @@
           <a:p>
             <a:pPr lvl="0"/>
             <a:r>
-              <a:rPr lang="de-DE" smtClean="0"/>
+              <a:rPr lang="de-DE"/>
               <a:t>Textmasterformat bearbeiten</a:t>
             </a:r>
           </a:p>
           <a:p>
             <a:pPr lvl="1"/>
             <a:r>
-              <a:rPr lang="de-DE" smtClean="0"/>
+              <a:rPr lang="de-DE"/>
               <a:t>Zweite Ebene</a:t>
             </a:r>
           </a:p>
           <a:p>
             <a:pPr lvl="2"/>
             <a:r>
-              <a:rPr lang="de-DE" smtClean="0"/>
+              <a:rPr lang="de-DE"/>
               <a:t>Dritte Ebene</a:t>
             </a:r>
           </a:p>
           <a:p>
             <a:pPr lvl="3"/>
             <a:r>
-              <a:rPr lang="de-DE" smtClean="0"/>
+              <a:rPr lang="de-DE"/>
               <a:t>Vierte Ebene</a:t>
             </a:r>
           </a:p>
           <a:p>
             <a:pPr lvl="4"/>
             <a:r>
-              <a:rPr lang="de-DE" smtClean="0"/>
+              <a:rPr lang="de-DE"/>
               <a:t>Fünfte Ebene</a:t>
             </a:r>
             <a:endParaRPr lang="en-GB"/>
@@ -2073,7 +2082,7 @@
           <a:p>
             <a:pPr lvl="0"/>
             <a:r>
-              <a:rPr lang="de-DE" smtClean="0"/>
+              <a:rPr lang="de-DE"/>
               <a:t>Textmasterformat bearbeiten</a:t>
             </a:r>
           </a:p>
@@ -2096,7 +2105,7 @@
           <a:p>
             <a:fld id="{92500A94-974E-4435-A24C-4E7E461F6CCF}" type="datetimeFigureOut">
               <a:rPr lang="en-GB" smtClean="0"/>
-              <a:t>10/12/2017</a:t>
+              <a:t>12/12/2017</a:t>
             </a:fld>
             <a:endParaRPr lang="en-GB"/>
           </a:p>
@@ -2138,7 +2147,7 @@
           <a:p>
             <a:fld id="{1D569112-266E-4592-BA97-2F0972958E72}" type="slidenum">
               <a:rPr lang="en-GB" smtClean="0"/>
-              <a:t>‹Nr.›</a:t>
+              <a:t>‹#›</a:t>
             </a:fld>
             <a:endParaRPr lang="en-GB"/>
           </a:p>
@@ -2199,7 +2208,7 @@
           </a:lstStyle>
           <a:p>
             <a:r>
-              <a:rPr lang="de-DE" smtClean="0"/>
+              <a:rPr lang="de-DE"/>
               <a:t>Titelmasterformat durch Klicken bearbeiten</a:t>
             </a:r>
             <a:endParaRPr lang="en-GB"/>
@@ -2326,7 +2335,7 @@
           <a:p>
             <a:pPr lvl="0"/>
             <a:r>
-              <a:rPr lang="de-DE" smtClean="0"/>
+              <a:rPr lang="de-DE"/>
               <a:t>Textmasterformat bearbeiten</a:t>
             </a:r>
           </a:p>
@@ -2349,7 +2358,7 @@
           <a:p>
             <a:fld id="{92500A94-974E-4435-A24C-4E7E461F6CCF}" type="datetimeFigureOut">
               <a:rPr lang="en-GB" smtClean="0"/>
-              <a:t>10/12/2017</a:t>
+              <a:t>12/12/2017</a:t>
             </a:fld>
             <a:endParaRPr lang="en-GB"/>
           </a:p>
@@ -2391,7 +2400,7 @@
           <a:p>
             <a:fld id="{1D569112-266E-4592-BA97-2F0972958E72}" type="slidenum">
               <a:rPr lang="en-GB" smtClean="0"/>
-              <a:t>‹Nr.›</a:t>
+              <a:t>‹#›</a:t>
             </a:fld>
             <a:endParaRPr lang="en-GB"/>
           </a:p>
@@ -2458,7 +2467,7 @@
           <a:lstStyle/>
           <a:p>
             <a:r>
-              <a:rPr lang="de-DE" smtClean="0"/>
+              <a:rPr lang="de-DE"/>
               <a:t>Titelmasterformat durch Klicken bearbeiten</a:t>
             </a:r>
             <a:endParaRPr lang="en-GB"/>
@@ -2492,35 +2501,35 @@
           <a:p>
             <a:pPr lvl="0"/>
             <a:r>
-              <a:rPr lang="de-DE" smtClean="0"/>
+              <a:rPr lang="de-DE"/>
               <a:t>Textmasterformat bearbeiten</a:t>
             </a:r>
           </a:p>
           <a:p>
             <a:pPr lvl="1"/>
             <a:r>
-              <a:rPr lang="de-DE" smtClean="0"/>
+              <a:rPr lang="de-DE"/>
               <a:t>Zweite Ebene</a:t>
             </a:r>
           </a:p>
           <a:p>
             <a:pPr lvl="2"/>
             <a:r>
-              <a:rPr lang="de-DE" smtClean="0"/>
+              <a:rPr lang="de-DE"/>
               <a:t>Dritte Ebene</a:t>
             </a:r>
           </a:p>
           <a:p>
             <a:pPr lvl="3"/>
             <a:r>
-              <a:rPr lang="de-DE" smtClean="0"/>
+              <a:rPr lang="de-DE"/>
               <a:t>Vierte Ebene</a:t>
             </a:r>
           </a:p>
           <a:p>
             <a:pPr lvl="4"/>
             <a:r>
-              <a:rPr lang="de-DE" smtClean="0"/>
+              <a:rPr lang="de-DE"/>
               <a:t>Fünfte Ebene</a:t>
             </a:r>
             <a:endParaRPr lang="en-GB"/>
@@ -2562,7 +2571,7 @@
           <a:p>
             <a:fld id="{92500A94-974E-4435-A24C-4E7E461F6CCF}" type="datetimeFigureOut">
               <a:rPr lang="en-GB" smtClean="0"/>
-              <a:t>10/12/2017</a:t>
+              <a:t>12/12/2017</a:t>
             </a:fld>
             <a:endParaRPr lang="en-GB"/>
           </a:p>
@@ -2640,7 +2649,7 @@
           <a:p>
             <a:fld id="{1D569112-266E-4592-BA97-2F0972958E72}" type="slidenum">
               <a:rPr lang="en-GB" smtClean="0"/>
-              <a:t>‹Nr.›</a:t>
+              <a:t>‹#›</a:t>
             </a:fld>
             <a:endParaRPr lang="en-GB"/>
           </a:p>
@@ -3023,43 +3032,19 @@
         </p:spPr>
         <p:txBody>
           <a:bodyPr>
-            <a:normAutofit/>
+            <a:noAutofit/>
           </a:bodyPr>
           <a:lstStyle/>
           <a:p>
             <a:r>
-              <a:rPr lang="en-GB" sz="3600" dirty="0" smtClean="0">
+              <a:rPr lang="en-GB" sz="4300" dirty="0">
                 <a:solidFill>
                   <a:schemeClr val="bg1"/>
                 </a:solidFill>
                 <a:latin typeface="Russo One" panose="02000503050000020004" pitchFamily="2" charset="0"/>
               </a:rPr>
-              <a:t>A </a:t>
-            </a:r>
-            <a:r>
-              <a:rPr lang="en-GB" sz="3600" dirty="0">
-                <a:solidFill>
-                  <a:schemeClr val="bg1"/>
-                </a:solidFill>
-                <a:latin typeface="Russo One" panose="02000503050000020004" pitchFamily="2" charset="0"/>
-              </a:rPr>
-              <a:t>D</a:t>
-            </a:r>
-            <a:r>
-              <a:rPr lang="en-GB" sz="3600" dirty="0" smtClean="0">
-                <a:solidFill>
-                  <a:schemeClr val="bg1"/>
-                </a:solidFill>
-                <a:latin typeface="Russo One" panose="02000503050000020004" pitchFamily="2" charset="0"/>
-              </a:rPr>
-              <a:t>istributed Playlist for Android</a:t>
-            </a:r>
-            <a:endParaRPr lang="en-GB" sz="3600" dirty="0">
-              <a:solidFill>
-                <a:schemeClr val="bg1"/>
-              </a:solidFill>
-              <a:latin typeface="Russo One" panose="02000503050000020004" pitchFamily="2" charset="0"/>
-            </a:endParaRPr>
+              <a:t>THE DISTRIBUTED PLAYLIST</a:t>
+            </a:r>
           </a:p>
         </p:txBody>
       </p:sp>
@@ -3073,13 +3058,6 @@
   <p:clrMapOvr>
     <a:masterClrMapping/>
   </p:clrMapOvr>
-  <p:timing>
-    <p:tnLst>
-      <p:par>
-        <p:cTn id="1" dur="indefinite" restart="never" nodeType="tmRoot"/>
-      </p:par>
-    </p:tnLst>
-  </p:timing>
 </p:sld>
 </file>
 
@@ -3130,7 +3108,7 @@
           <a:lstStyle/>
           <a:p>
             <a:r>
-              <a:rPr lang="en-GB" sz="900" dirty="0" smtClean="0">
+              <a:rPr lang="en-GB" sz="900" dirty="0">
                 <a:solidFill>
                   <a:schemeClr val="bg1">
                     <a:lumMod val="50000"/>
@@ -3140,7 +3118,7 @@
               <a:t>https://www.flaticon.com/free-icon/quarrel_284159#term=people </a:t>
             </a:r>
             <a:r>
-              <a:rPr lang="en-GB" sz="900" dirty="0" err="1" smtClean="0">
+              <a:rPr lang="en-GB" sz="900" dirty="0" err="1">
                 <a:solidFill>
                   <a:schemeClr val="bg1">
                     <a:lumMod val="50000"/>
@@ -3150,7 +3128,7 @@
               <a:t>arguing&amp;page</a:t>
             </a:r>
             <a:r>
-              <a:rPr lang="en-GB" sz="900" dirty="0" smtClean="0">
+              <a:rPr lang="en-GB" sz="900" dirty="0">
                 <a:solidFill>
                   <a:schemeClr val="bg1">
                     <a:lumMod val="50000"/>
@@ -3159,13 +3137,6 @@
               </a:rPr>
               <a:t>=1&amp;position=1</a:t>
             </a:r>
-            <a:endParaRPr lang="en-GB" sz="900" dirty="0">
-              <a:solidFill>
-                <a:schemeClr val="bg1">
-                  <a:lumMod val="50000"/>
-                </a:schemeClr>
-              </a:solidFill>
-            </a:endParaRPr>
           </a:p>
         </p:txBody>
       </p:sp>
@@ -3221,7 +3192,7 @@
           <a:lstStyle/>
           <a:p>
             <a:r>
-              <a:rPr lang="en-GB" sz="900" dirty="0" smtClean="0">
+              <a:rPr lang="en-GB" sz="900" dirty="0">
                 <a:solidFill>
                   <a:schemeClr val="bg1">
                     <a:lumMod val="50000"/>
@@ -3230,13 +3201,6 @@
               </a:rPr>
               <a:t>https://www.flaticon.com/free-icon/musical-notes-symbols_11178#term=music&amp;page=2&amp;position=59</a:t>
             </a:r>
-            <a:endParaRPr lang="en-GB" sz="900" dirty="0">
-              <a:solidFill>
-                <a:schemeClr val="bg1">
-                  <a:lumMod val="50000"/>
-                </a:schemeClr>
-              </a:solidFill>
-            </a:endParaRPr>
           </a:p>
         </p:txBody>
       </p:sp>
@@ -3297,7 +3261,7 @@
               <a:buChar char="•"/>
             </a:pPr>
             <a:r>
-              <a:rPr lang="en-GB" sz="3200" dirty="0" smtClean="0">
+              <a:rPr lang="en-GB" sz="3200" dirty="0">
                 <a:solidFill>
                   <a:schemeClr val="bg1"/>
                 </a:solidFill>
@@ -3324,7 +3288,7 @@
               <a:buChar char="•"/>
             </a:pPr>
             <a:r>
-              <a:rPr lang="en-GB" sz="3200" dirty="0" err="1" smtClean="0">
+              <a:rPr lang="en-GB" sz="3200" dirty="0" err="1">
                 <a:solidFill>
                   <a:schemeClr val="bg1"/>
                 </a:solidFill>
@@ -3333,7 +3297,7 @@
               <a:t>Kompose</a:t>
             </a:r>
             <a:r>
-              <a:rPr lang="en-GB" sz="3200" dirty="0" smtClean="0">
+              <a:rPr lang="en-GB" sz="3200" dirty="0">
                 <a:solidFill>
                   <a:schemeClr val="bg1"/>
                 </a:solidFill>
@@ -3360,7 +3324,7 @@
               <a:buChar char="•"/>
             </a:pPr>
             <a:r>
-              <a:rPr lang="en-GB" sz="3200" dirty="0" smtClean="0">
+              <a:rPr lang="en-GB" sz="3200" dirty="0">
                 <a:solidFill>
                   <a:schemeClr val="bg1"/>
                 </a:solidFill>
@@ -3368,7 +3332,7 @@
               </a:rPr>
               <a:t>Distributed Song App</a:t>
             </a:r>
-            <a:endParaRPr lang="en-GB" dirty="0" smtClean="0">
+            <a:endParaRPr lang="en-GB" dirty="0">
               <a:solidFill>
                 <a:schemeClr val="bg1"/>
               </a:solidFill>
@@ -3411,13 +3375,6 @@
   <p:clrMapOvr>
     <a:masterClrMapping/>
   </p:clrMapOvr>
-  <p:timing>
-    <p:tnLst>
-      <p:par>
-        <p:cTn id="1" dur="indefinite" restart="never" nodeType="tmRoot"/>
-      </p:par>
-    </p:tnLst>
-  </p:timing>
 </p:sld>
 </file>
 
@@ -3473,22 +3430,13 @@
               <a:buChar char="•"/>
             </a:pPr>
             <a:r>
-              <a:rPr lang="en-GB" sz="3200" dirty="0" smtClean="0">
+              <a:rPr lang="en-GB" sz="3200" dirty="0">
                 <a:solidFill>
                   <a:schemeClr val="bg1"/>
                 </a:solidFill>
                 <a:latin typeface="Russo One" panose="02000503050000020004" pitchFamily="2" charset="0"/>
               </a:rPr>
-              <a:t>Settings</a:t>
-            </a:r>
-            <a:r>
-              <a:rPr lang="en-GB" sz="3200" dirty="0" smtClean="0">
-                <a:solidFill>
-                  <a:schemeClr val="bg1"/>
-                </a:solidFill>
-                <a:latin typeface="Russo One" panose="02000503050000020004" pitchFamily="2" charset="0"/>
-              </a:rPr>
-              <a:t> </a:t>
+              <a:t>Settings </a:t>
             </a:r>
           </a:p>
           <a:p>
@@ -3509,7 +3457,7 @@
               <a:buChar char="•"/>
             </a:pPr>
             <a:r>
-              <a:rPr lang="en-GB" sz="3200" dirty="0" smtClean="0">
+              <a:rPr lang="en-GB" sz="3200" dirty="0">
                 <a:solidFill>
                   <a:schemeClr val="bg1"/>
                 </a:solidFill>
@@ -3536,7 +3484,7 @@
               <a:buChar char="•"/>
             </a:pPr>
             <a:r>
-              <a:rPr lang="en-GB" sz="3200" dirty="0" smtClean="0">
+              <a:rPr lang="en-GB" sz="3200" dirty="0">
                 <a:solidFill>
                   <a:schemeClr val="bg1"/>
                 </a:solidFill>
@@ -3563,7 +3511,7 @@
               <a:buChar char="•"/>
             </a:pPr>
             <a:r>
-              <a:rPr lang="en-GB" sz="3200" dirty="0" smtClean="0">
+              <a:rPr lang="en-GB" sz="3200" dirty="0">
                 <a:solidFill>
                   <a:schemeClr val="bg1"/>
                 </a:solidFill>
@@ -3571,12 +3519,6 @@
               </a:rPr>
               <a:t>Down vote a song </a:t>
             </a:r>
-            <a:endParaRPr lang="en-GB" sz="3200" dirty="0">
-              <a:solidFill>
-                <a:schemeClr val="bg1"/>
-              </a:solidFill>
-              <a:latin typeface="Russo One" panose="02000503050000020004" pitchFamily="2" charset="0"/>
-            </a:endParaRPr>
           </a:p>
         </p:txBody>
       </p:sp>
@@ -3769,13 +3711,6 @@
   <p:clrMapOvr>
     <a:masterClrMapping/>
   </p:clrMapOvr>
-  <p:timing>
-    <p:tnLst>
-      <p:par>
-        <p:cTn id="1" dur="indefinite" restart="never" nodeType="tmRoot"/>
-      </p:par>
-    </p:tnLst>
-  </p:timing>
 </p:sld>
 </file>
 
@@ -3806,45 +3741,6 @@
       </p:grpSpPr>
       <p:sp>
         <p:nvSpPr>
-          <p:cNvPr id="2" name="Titel 1"/>
-          <p:cNvSpPr>
-            <a:spLocks noGrp="1"/>
-          </p:cNvSpPr>
-          <p:nvPr>
-            <p:ph type="title"/>
-          </p:nvPr>
-        </p:nvSpPr>
-        <p:spPr>
-          <a:xfrm>
-            <a:off x="831850" y="1078367"/>
-            <a:ext cx="10515600" cy="2852737"/>
-          </a:xfrm>
-        </p:spPr>
-        <p:txBody>
-          <a:bodyPr anchor="ctr"/>
-          <a:lstStyle/>
-          <a:p>
-            <a:pPr algn="ctr"/>
-            <a:r>
-              <a:rPr lang="en-GB" dirty="0" smtClean="0">
-                <a:solidFill>
-                  <a:schemeClr val="bg1"/>
-                </a:solidFill>
-                <a:latin typeface="Russo One" panose="02000503050000020004" pitchFamily="2" charset="0"/>
-              </a:rPr>
-              <a:t>	And much more !!</a:t>
-            </a:r>
-            <a:endParaRPr lang="en-GB" dirty="0">
-              <a:solidFill>
-                <a:schemeClr val="bg1"/>
-              </a:solidFill>
-              <a:latin typeface="Russo One" panose="02000503050000020004" pitchFamily="2" charset="0"/>
-            </a:endParaRPr>
-          </a:p>
-        </p:txBody>
-      </p:sp>
-      <p:sp>
-        <p:nvSpPr>
           <p:cNvPr id="3" name="Textplatzhalter 2"/>
           <p:cNvSpPr>
             <a:spLocks noGrp="1"/>
@@ -3867,7 +3763,7 @@
           <a:p>
             <a:pPr algn="ctr"/>
             <a:r>
-              <a:rPr lang="en-GB" sz="3600" dirty="0" smtClean="0">
+              <a:rPr lang="en-GB" sz="3600" dirty="0">
                 <a:solidFill>
                   <a:schemeClr val="bg1"/>
                 </a:solidFill>
@@ -3876,24 +3772,15 @@
               <a:t>Explore it yourself </a:t>
             </a:r>
             <a:br>
-              <a:rPr lang="en-GB" sz="3600" dirty="0" smtClean="0">
+              <a:rPr lang="en-GB" sz="3600" dirty="0">
                 <a:solidFill>
                   <a:schemeClr val="bg1"/>
                 </a:solidFill>
                 <a:latin typeface="Russo One" panose="02000503050000020004" pitchFamily="2" charset="0"/>
               </a:rPr>
             </a:br>
-            <a:r>
-              <a:rPr lang="en-GB" sz="3600" dirty="0" smtClean="0">
-                <a:solidFill>
-                  <a:schemeClr val="bg1"/>
-                </a:solidFill>
-                <a:latin typeface="Russo One" panose="02000503050000020004" pitchFamily="2" charset="0"/>
-              </a:rPr>
-              <a:t/>
-            </a:r>
             <a:br>
-              <a:rPr lang="en-GB" sz="3600" dirty="0" smtClean="0">
+              <a:rPr lang="en-GB" sz="3600" dirty="0">
                 <a:solidFill>
                   <a:schemeClr val="bg1"/>
                 </a:solidFill>
@@ -3901,7 +3788,7 @@
               </a:rPr>
             </a:br>
             <a:r>
-              <a:rPr lang="en-GB" sz="3600" dirty="0" smtClean="0">
+              <a:rPr lang="en-GB" sz="3600" dirty="0">
                 <a:solidFill>
                   <a:schemeClr val="bg1"/>
                 </a:solidFill>
@@ -3909,12 +3796,6 @@
               </a:rPr>
               <a:t>Come see us later</a:t>
             </a:r>
-            <a:endParaRPr lang="en-GB" sz="3600" dirty="0">
-              <a:solidFill>
-                <a:schemeClr val="bg1"/>
-              </a:solidFill>
-              <a:latin typeface="Russo One" panose="02000503050000020004" pitchFamily="2" charset="0"/>
-            </a:endParaRPr>
           </a:p>
         </p:txBody>
       </p:sp>

</xml_diff>